<commit_message>
Small changes throughout the paper
</commit_message>
<xml_diff>
--- a/figures/Datapath_Separate.pptx
+++ b/figures/Datapath_Separate.pptx
@@ -2973,141 +2973,6 @@
       </p:grpSpPr>
       <p:sp>
         <p:nvSpPr>
-          <p:cNvPr id="40" name="Right Arrow 39"/>
-          <p:cNvSpPr/>
-          <p:nvPr/>
-        </p:nvSpPr>
-        <p:spPr>
-          <a:xfrm>
-            <a:off x="5120802" y="2125832"/>
-            <a:ext cx="958604" cy="358253"/>
-          </a:xfrm>
-          <a:prstGeom prst="rightArrow">
-            <a:avLst/>
-          </a:prstGeom>
-          <a:ln>
-            <a:solidFill>
-              <a:schemeClr val="tx1"/>
-            </a:solidFill>
-          </a:ln>
-        </p:spPr>
-        <p:style>
-          <a:lnRef idx="2">
-            <a:schemeClr val="accent6"/>
-          </a:lnRef>
-          <a:fillRef idx="1">
-            <a:schemeClr val="lt1"/>
-          </a:fillRef>
-          <a:effectRef idx="0">
-            <a:schemeClr val="accent6"/>
-          </a:effectRef>
-          <a:fontRef idx="minor">
-            <a:schemeClr val="dk1"/>
-          </a:fontRef>
-        </p:style>
-        <p:txBody>
-          <a:bodyPr rtlCol="0" anchor="ctr"/>
-          <a:lstStyle/>
-          <a:p>
-            <a:pPr algn="ctr"/>
-            <a:endParaRPr lang="en-IN" sz="2813" dirty="0">
-              <a:cs typeface="Times New Roman" panose="02020603050405020304" pitchFamily="18" charset="0"/>
-            </a:endParaRPr>
-          </a:p>
-        </p:txBody>
-      </p:sp>
-      <p:sp>
-        <p:nvSpPr>
-          <p:cNvPr id="53" name="Right Arrow 52"/>
-          <p:cNvSpPr/>
-          <p:nvPr/>
-        </p:nvSpPr>
-        <p:spPr>
-          <a:xfrm>
-            <a:off x="4969265" y="5159890"/>
-            <a:ext cx="1233446" cy="383844"/>
-          </a:xfrm>
-          <a:prstGeom prst="rightArrow">
-            <a:avLst/>
-          </a:prstGeom>
-          <a:ln>
-            <a:solidFill>
-              <a:schemeClr val="tx1"/>
-            </a:solidFill>
-          </a:ln>
-        </p:spPr>
-        <p:style>
-          <a:lnRef idx="2">
-            <a:schemeClr val="accent6"/>
-          </a:lnRef>
-          <a:fillRef idx="1">
-            <a:schemeClr val="lt1"/>
-          </a:fillRef>
-          <a:effectRef idx="0">
-            <a:schemeClr val="accent6"/>
-          </a:effectRef>
-          <a:fontRef idx="minor">
-            <a:schemeClr val="dk1"/>
-          </a:fontRef>
-        </p:style>
-        <p:txBody>
-          <a:bodyPr rtlCol="0" anchor="ctr"/>
-          <a:lstStyle/>
-          <a:p>
-            <a:pPr algn="ctr"/>
-            <a:endParaRPr lang="en-IN" sz="2813">
-              <a:cs typeface="Times New Roman" panose="02020603050405020304" pitchFamily="18" charset="0"/>
-            </a:endParaRPr>
-          </a:p>
-        </p:txBody>
-      </p:sp>
-      <p:sp>
-        <p:nvSpPr>
-          <p:cNvPr id="41" name="Down Arrow 40"/>
-          <p:cNvSpPr/>
-          <p:nvPr/>
-        </p:nvSpPr>
-        <p:spPr>
-          <a:xfrm>
-            <a:off x="2764557" y="866811"/>
-            <a:ext cx="332664" cy="488610"/>
-          </a:xfrm>
-          <a:prstGeom prst="downArrow">
-            <a:avLst/>
-          </a:prstGeom>
-          <a:ln>
-            <a:solidFill>
-              <a:schemeClr val="tx1"/>
-            </a:solidFill>
-          </a:ln>
-        </p:spPr>
-        <p:style>
-          <a:lnRef idx="2">
-            <a:schemeClr val="accent6"/>
-          </a:lnRef>
-          <a:fillRef idx="1">
-            <a:schemeClr val="lt1"/>
-          </a:fillRef>
-          <a:effectRef idx="0">
-            <a:schemeClr val="accent6"/>
-          </a:effectRef>
-          <a:fontRef idx="minor">
-            <a:schemeClr val="dk1"/>
-          </a:fontRef>
-        </p:style>
-        <p:txBody>
-          <a:bodyPr rtlCol="0" anchor="ctr"/>
-          <a:lstStyle/>
-          <a:p>
-            <a:pPr algn="ctr"/>
-            <a:endParaRPr lang="en-IN" sz="2813" dirty="0">
-              <a:cs typeface="Times New Roman" panose="02020603050405020304" pitchFamily="18" charset="0"/>
-            </a:endParaRPr>
-          </a:p>
-        </p:txBody>
-      </p:sp>
-      <p:sp>
-        <p:nvSpPr>
           <p:cNvPr id="33" name="Rectangle 32"/>
           <p:cNvSpPr/>
           <p:nvPr/>
@@ -3175,7 +3040,7 @@
           <a:prstGeom prst="straightConnector1">
             <a:avLst/>
           </a:prstGeom>
-          <a:ln>
+          <a:ln w="12700">
             <a:solidFill>
               <a:schemeClr val="tx1"/>
             </a:solidFill>
@@ -3214,7 +3079,7 @@
           <a:prstGeom prst="straightConnector1">
             <a:avLst/>
           </a:prstGeom>
-          <a:ln>
+          <a:ln w="12700">
             <a:solidFill>
               <a:schemeClr val="tx1"/>
             </a:solidFill>
@@ -3253,7 +3118,7 @@
           <a:prstGeom prst="straightConnector1">
             <a:avLst/>
           </a:prstGeom>
-          <a:ln>
+          <a:ln w="12700">
             <a:solidFill>
               <a:schemeClr val="tx1"/>
             </a:solidFill>
@@ -3343,7 +3208,7 @@
           <a:prstGeom prst="bentConnector2">
             <a:avLst/>
           </a:prstGeom>
-          <a:ln>
+          <a:ln w="12700">
             <a:solidFill>
               <a:schemeClr val="tx1"/>
             </a:solidFill>
@@ -3543,21 +3408,21 @@
                 <a:gridCol w="1242400">
                   <a:extLst>
                     <a:ext uri="{9D8B030D-6E8A-4147-A177-3AD203B41FA5}">
-                      <a16:colId xmlns="" xmlns:a16="http://schemas.microsoft.com/office/drawing/2014/main" val="20000"/>
+                      <a16:colId xmlns:a16="http://schemas.microsoft.com/office/drawing/2014/main" xmlns="" val="20000"/>
                     </a:ext>
                   </a:extLst>
                 </a:gridCol>
                 <a:gridCol w="1148926">
                   <a:extLst>
                     <a:ext uri="{9D8B030D-6E8A-4147-A177-3AD203B41FA5}">
-                      <a16:colId xmlns="" xmlns:a16="http://schemas.microsoft.com/office/drawing/2014/main" val="20001"/>
+                      <a16:colId xmlns:a16="http://schemas.microsoft.com/office/drawing/2014/main" xmlns="" val="20001"/>
                     </a:ext>
                   </a:extLst>
                 </a:gridCol>
                 <a:gridCol w="1402505">
                   <a:extLst>
                     <a:ext uri="{9D8B030D-6E8A-4147-A177-3AD203B41FA5}">
-                      <a16:colId xmlns="" xmlns:a16="http://schemas.microsoft.com/office/drawing/2014/main" val="20002"/>
+                      <a16:colId xmlns:a16="http://schemas.microsoft.com/office/drawing/2014/main" xmlns="" val="20002"/>
                     </a:ext>
                   </a:extLst>
                 </a:gridCol>
@@ -3622,7 +3487,7 @@
                 </a:tc>
                 <a:extLst>
                   <a:ext uri="{0D108BD9-81ED-4DB2-BD59-A6C34878D82A}">
-                    <a16:rowId xmlns="" xmlns:a16="http://schemas.microsoft.com/office/drawing/2014/main" val="10000"/>
+                    <a16:rowId xmlns:a16="http://schemas.microsoft.com/office/drawing/2014/main" xmlns="" val="10000"/>
                   </a:ext>
                 </a:extLst>
               </a:tr>
@@ -3747,7 +3612,7 @@
           <a:prstGeom prst="straightConnector1">
             <a:avLst/>
           </a:prstGeom>
-          <a:ln w="19050">
+          <a:ln w="12700">
             <a:solidFill>
               <a:schemeClr val="tx1">
                 <a:lumMod val="95000"/>
@@ -3786,7 +3651,7 @@
           <a:prstGeom prst="straightConnector1">
             <a:avLst/>
           </a:prstGeom>
-          <a:ln w="19050">
+          <a:ln w="12700">
             <a:solidFill>
               <a:schemeClr val="tx1">
                 <a:lumMod val="95000"/>
@@ -3825,7 +3690,7 @@
           <a:prstGeom prst="straightConnector1">
             <a:avLst/>
           </a:prstGeom>
-          <a:ln w="19050">
+          <a:ln w="12700">
             <a:solidFill>
               <a:schemeClr val="tx1">
                 <a:lumMod val="95000"/>
@@ -3980,7 +3845,7 @@
                 <a:gridCol w="1113004">
                   <a:extLst>
                     <a:ext uri="{9D8B030D-6E8A-4147-A177-3AD203B41FA5}">
-                      <a16:colId xmlns="" xmlns:a16="http://schemas.microsoft.com/office/drawing/2014/main" val="20001"/>
+                      <a16:colId xmlns:a16="http://schemas.microsoft.com/office/drawing/2014/main" xmlns="" val="20001"/>
                     </a:ext>
                   </a:extLst>
                 </a:gridCol>
@@ -4011,7 +3876,7 @@
                 </a:tc>
                 <a:extLst>
                   <a:ext uri="{0D108BD9-81ED-4DB2-BD59-A6C34878D82A}">
-                    <a16:rowId xmlns="" xmlns:a16="http://schemas.microsoft.com/office/drawing/2014/main" val="10000"/>
+                    <a16:rowId xmlns:a16="http://schemas.microsoft.com/office/drawing/2014/main" xmlns="" val="10000"/>
                   </a:ext>
                 </a:extLst>
               </a:tr>
@@ -4048,7 +3913,7 @@
                 </a:tc>
                 <a:extLst>
                   <a:ext uri="{0D108BD9-81ED-4DB2-BD59-A6C34878D82A}">
-                    <a16:rowId xmlns="" xmlns:a16="http://schemas.microsoft.com/office/drawing/2014/main" val="10001"/>
+                    <a16:rowId xmlns:a16="http://schemas.microsoft.com/office/drawing/2014/main" xmlns="" val="10001"/>
                   </a:ext>
                 </a:extLst>
               </a:tr>
@@ -4085,7 +3950,7 @@
                 </a:tc>
                 <a:extLst>
                   <a:ext uri="{0D108BD9-81ED-4DB2-BD59-A6C34878D82A}">
-                    <a16:rowId xmlns="" xmlns:a16="http://schemas.microsoft.com/office/drawing/2014/main" val="10002"/>
+                    <a16:rowId xmlns:a16="http://schemas.microsoft.com/office/drawing/2014/main" xmlns="" val="10002"/>
                   </a:ext>
                 </a:extLst>
               </a:tr>
@@ -4139,7 +4004,7 @@
                 </a:tc>
                 <a:extLst>
                   <a:ext uri="{0D108BD9-81ED-4DB2-BD59-A6C34878D82A}">
-                    <a16:rowId xmlns="" xmlns:a16="http://schemas.microsoft.com/office/drawing/2014/main" val="10003"/>
+                    <a16:rowId xmlns:a16="http://schemas.microsoft.com/office/drawing/2014/main" xmlns="" val="10003"/>
                   </a:ext>
                 </a:extLst>
               </a:tr>
@@ -4243,7 +4108,7 @@
                 </a:tc>
                 <a:extLst>
                   <a:ext uri="{0D108BD9-81ED-4DB2-BD59-A6C34878D82A}">
-                    <a16:rowId xmlns="" xmlns:a16="http://schemas.microsoft.com/office/drawing/2014/main" val="10004"/>
+                    <a16:rowId xmlns:a16="http://schemas.microsoft.com/office/drawing/2014/main" xmlns="" val="10004"/>
                   </a:ext>
                 </a:extLst>
               </a:tr>
@@ -4279,7 +4144,7 @@
                 <a:gridCol w="1128850">
                   <a:extLst>
                     <a:ext uri="{9D8B030D-6E8A-4147-A177-3AD203B41FA5}">
-                      <a16:colId xmlns="" xmlns:a16="http://schemas.microsoft.com/office/drawing/2014/main" val="20001"/>
+                      <a16:colId xmlns:a16="http://schemas.microsoft.com/office/drawing/2014/main" xmlns="" val="20001"/>
                     </a:ext>
                   </a:extLst>
                 </a:gridCol>
@@ -4310,7 +4175,7 @@
                 </a:tc>
                 <a:extLst>
                   <a:ext uri="{0D108BD9-81ED-4DB2-BD59-A6C34878D82A}">
-                    <a16:rowId xmlns="" xmlns:a16="http://schemas.microsoft.com/office/drawing/2014/main" val="10000"/>
+                    <a16:rowId xmlns:a16="http://schemas.microsoft.com/office/drawing/2014/main" xmlns="" val="10000"/>
                   </a:ext>
                 </a:extLst>
               </a:tr>
@@ -4347,7 +4212,7 @@
                 </a:tc>
                 <a:extLst>
                   <a:ext uri="{0D108BD9-81ED-4DB2-BD59-A6C34878D82A}">
-                    <a16:rowId xmlns="" xmlns:a16="http://schemas.microsoft.com/office/drawing/2014/main" val="10001"/>
+                    <a16:rowId xmlns:a16="http://schemas.microsoft.com/office/drawing/2014/main" xmlns="" val="10001"/>
                   </a:ext>
                 </a:extLst>
               </a:tr>
@@ -4384,7 +4249,7 @@
                 </a:tc>
                 <a:extLst>
                   <a:ext uri="{0D108BD9-81ED-4DB2-BD59-A6C34878D82A}">
-                    <a16:rowId xmlns="" xmlns:a16="http://schemas.microsoft.com/office/drawing/2014/main" val="10002"/>
+                    <a16:rowId xmlns:a16="http://schemas.microsoft.com/office/drawing/2014/main" xmlns="" val="10002"/>
                   </a:ext>
                 </a:extLst>
               </a:tr>
@@ -4407,7 +4272,7 @@
                 </a:tc>
                 <a:extLst>
                   <a:ext uri="{0D108BD9-81ED-4DB2-BD59-A6C34878D82A}">
-                    <a16:rowId xmlns="" xmlns:a16="http://schemas.microsoft.com/office/drawing/2014/main" val="10003"/>
+                    <a16:rowId xmlns:a16="http://schemas.microsoft.com/office/drawing/2014/main" xmlns="" val="10003"/>
                   </a:ext>
                 </a:extLst>
               </a:tr>
@@ -4444,7 +4309,7 @@
                 </a:tc>
                 <a:extLst>
                   <a:ext uri="{0D108BD9-81ED-4DB2-BD59-A6C34878D82A}">
-                    <a16:rowId xmlns="" xmlns:a16="http://schemas.microsoft.com/office/drawing/2014/main" val="10004"/>
+                    <a16:rowId xmlns:a16="http://schemas.microsoft.com/office/drawing/2014/main" xmlns="" val="10004"/>
                   </a:ext>
                 </a:extLst>
               </a:tr>
@@ -4480,7 +4345,7 @@
                 <a:gridCol w="1127895">
                   <a:extLst>
                     <a:ext uri="{9D8B030D-6E8A-4147-A177-3AD203B41FA5}">
-                      <a16:colId xmlns="" xmlns:a16="http://schemas.microsoft.com/office/drawing/2014/main" val="20001"/>
+                      <a16:colId xmlns:a16="http://schemas.microsoft.com/office/drawing/2014/main" xmlns="" val="20001"/>
                     </a:ext>
                   </a:extLst>
                 </a:gridCol>
@@ -4511,7 +4376,7 @@
                 </a:tc>
                 <a:extLst>
                   <a:ext uri="{0D108BD9-81ED-4DB2-BD59-A6C34878D82A}">
-                    <a16:rowId xmlns="" xmlns:a16="http://schemas.microsoft.com/office/drawing/2014/main" val="10000"/>
+                    <a16:rowId xmlns:a16="http://schemas.microsoft.com/office/drawing/2014/main" xmlns="" val="10000"/>
                   </a:ext>
                 </a:extLst>
               </a:tr>
@@ -4548,7 +4413,7 @@
                 </a:tc>
                 <a:extLst>
                   <a:ext uri="{0D108BD9-81ED-4DB2-BD59-A6C34878D82A}">
-                    <a16:rowId xmlns="" xmlns:a16="http://schemas.microsoft.com/office/drawing/2014/main" val="10001"/>
+                    <a16:rowId xmlns:a16="http://schemas.microsoft.com/office/drawing/2014/main" xmlns="" val="10001"/>
                   </a:ext>
                 </a:extLst>
               </a:tr>
@@ -4585,7 +4450,7 @@
                 </a:tc>
                 <a:extLst>
                   <a:ext uri="{0D108BD9-81ED-4DB2-BD59-A6C34878D82A}">
-                    <a16:rowId xmlns="" xmlns:a16="http://schemas.microsoft.com/office/drawing/2014/main" val="10002"/>
+                    <a16:rowId xmlns:a16="http://schemas.microsoft.com/office/drawing/2014/main" xmlns="" val="10002"/>
                   </a:ext>
                 </a:extLst>
               </a:tr>
@@ -4639,7 +4504,7 @@
                 </a:tc>
                 <a:extLst>
                   <a:ext uri="{0D108BD9-81ED-4DB2-BD59-A6C34878D82A}">
-                    <a16:rowId xmlns="" xmlns:a16="http://schemas.microsoft.com/office/drawing/2014/main" val="10003"/>
+                    <a16:rowId xmlns:a16="http://schemas.microsoft.com/office/drawing/2014/main" xmlns="" val="10003"/>
                   </a:ext>
                 </a:extLst>
               </a:tr>
@@ -4694,7 +4559,7 @@
                 </a:tc>
                 <a:extLst>
                   <a:ext uri="{0D108BD9-81ED-4DB2-BD59-A6C34878D82A}">
-                    <a16:rowId xmlns="" xmlns:a16="http://schemas.microsoft.com/office/drawing/2014/main" val="10004"/>
+                    <a16:rowId xmlns:a16="http://schemas.microsoft.com/office/drawing/2014/main" xmlns="" val="10004"/>
                   </a:ext>
                 </a:extLst>
               </a:tr>
@@ -4702,186 +4567,6 @@
           </a:graphicData>
         </a:graphic>
       </p:graphicFrame>
-      <p:sp>
-        <p:nvSpPr>
-          <p:cNvPr id="25" name="Up Arrow 24"/>
-          <p:cNvSpPr/>
-          <p:nvPr/>
-        </p:nvSpPr>
-        <p:spPr>
-          <a:xfrm>
-            <a:off x="7948822" y="11174733"/>
-            <a:ext cx="371046" cy="660985"/>
-          </a:xfrm>
-          <a:prstGeom prst="upArrow">
-            <a:avLst/>
-          </a:prstGeom>
-          <a:ln>
-            <a:solidFill>
-              <a:schemeClr val="tx1"/>
-            </a:solidFill>
-          </a:ln>
-        </p:spPr>
-        <p:style>
-          <a:lnRef idx="2">
-            <a:schemeClr val="accent6"/>
-          </a:lnRef>
-          <a:fillRef idx="1">
-            <a:schemeClr val="lt1"/>
-          </a:fillRef>
-          <a:effectRef idx="0">
-            <a:schemeClr val="accent6"/>
-          </a:effectRef>
-          <a:fontRef idx="minor">
-            <a:schemeClr val="dk1"/>
-          </a:fontRef>
-        </p:style>
-        <p:txBody>
-          <a:bodyPr rtlCol="0" anchor="ctr"/>
-          <a:lstStyle/>
-          <a:p>
-            <a:pPr algn="ctr"/>
-            <a:endParaRPr lang="en-IN" sz="2813">
-              <a:cs typeface="Times New Roman" panose="02020603050405020304" pitchFamily="18" charset="0"/>
-            </a:endParaRPr>
-          </a:p>
-        </p:txBody>
-      </p:sp>
-      <p:sp>
-        <p:nvSpPr>
-          <p:cNvPr id="26" name="Up Arrow 25"/>
-          <p:cNvSpPr/>
-          <p:nvPr/>
-        </p:nvSpPr>
-        <p:spPr>
-          <a:xfrm>
-            <a:off x="7949721" y="8799476"/>
-            <a:ext cx="413695" cy="1560465"/>
-          </a:xfrm>
-          <a:prstGeom prst="upArrow">
-            <a:avLst/>
-          </a:prstGeom>
-          <a:ln>
-            <a:solidFill>
-              <a:schemeClr val="tx1"/>
-            </a:solidFill>
-          </a:ln>
-        </p:spPr>
-        <p:style>
-          <a:lnRef idx="2">
-            <a:schemeClr val="accent6"/>
-          </a:lnRef>
-          <a:fillRef idx="1">
-            <a:schemeClr val="lt1"/>
-          </a:fillRef>
-          <a:effectRef idx="0">
-            <a:schemeClr val="accent6"/>
-          </a:effectRef>
-          <a:fontRef idx="minor">
-            <a:schemeClr val="dk1"/>
-          </a:fontRef>
-        </p:style>
-        <p:txBody>
-          <a:bodyPr rtlCol="0" anchor="ctr"/>
-          <a:lstStyle/>
-          <a:p>
-            <a:pPr algn="ctr"/>
-            <a:endParaRPr lang="en-IN" sz="2813">
-              <a:cs typeface="Times New Roman" panose="02020603050405020304" pitchFamily="18" charset="0"/>
-            </a:endParaRPr>
-          </a:p>
-        </p:txBody>
-      </p:sp>
-      <p:sp>
-        <p:nvSpPr>
-          <p:cNvPr id="27" name="Left Arrow 26"/>
-          <p:cNvSpPr/>
-          <p:nvPr/>
-        </p:nvSpPr>
-        <p:spPr>
-          <a:xfrm>
-            <a:off x="4586768" y="7829898"/>
-            <a:ext cx="1425412" cy="383843"/>
-          </a:xfrm>
-          <a:prstGeom prst="leftArrow">
-            <a:avLst/>
-          </a:prstGeom>
-          <a:ln>
-            <a:solidFill>
-              <a:schemeClr val="tx1"/>
-            </a:solidFill>
-          </a:ln>
-        </p:spPr>
-        <p:style>
-          <a:lnRef idx="2">
-            <a:schemeClr val="accent6"/>
-          </a:lnRef>
-          <a:fillRef idx="1">
-            <a:schemeClr val="lt1"/>
-          </a:fillRef>
-          <a:effectRef idx="0">
-            <a:schemeClr val="accent6"/>
-          </a:effectRef>
-          <a:fontRef idx="minor">
-            <a:schemeClr val="dk1"/>
-          </a:fontRef>
-        </p:style>
-        <p:txBody>
-          <a:bodyPr rtlCol="0" anchor="ctr"/>
-          <a:lstStyle/>
-          <a:p>
-            <a:pPr algn="ctr"/>
-            <a:endParaRPr lang="en-IN" sz="2813" dirty="0">
-              <a:cs typeface="Times New Roman" panose="02020603050405020304" pitchFamily="18" charset="0"/>
-            </a:endParaRPr>
-          </a:p>
-        </p:txBody>
-      </p:sp>
-      <p:sp>
-        <p:nvSpPr>
-          <p:cNvPr id="28" name="Down Arrow 27"/>
-          <p:cNvSpPr/>
-          <p:nvPr/>
-        </p:nvSpPr>
-        <p:spPr>
-          <a:xfrm>
-            <a:off x="2820317" y="8249030"/>
-            <a:ext cx="332664" cy="958667"/>
-          </a:xfrm>
-          <a:prstGeom prst="downArrow">
-            <a:avLst/>
-          </a:prstGeom>
-          <a:ln>
-            <a:solidFill>
-              <a:schemeClr val="tx1"/>
-            </a:solidFill>
-          </a:ln>
-        </p:spPr>
-        <p:style>
-          <a:lnRef idx="2">
-            <a:schemeClr val="accent6"/>
-          </a:lnRef>
-          <a:fillRef idx="1">
-            <a:schemeClr val="lt1"/>
-          </a:fillRef>
-          <a:effectRef idx="0">
-            <a:schemeClr val="accent6"/>
-          </a:effectRef>
-          <a:fontRef idx="minor">
-            <a:schemeClr val="dk1"/>
-          </a:fontRef>
-        </p:style>
-        <p:txBody>
-          <a:bodyPr rtlCol="0" anchor="ctr"/>
-          <a:lstStyle/>
-          <a:p>
-            <a:pPr algn="ctr"/>
-            <a:endParaRPr lang="en-IN" sz="2813" dirty="0">
-              <a:cs typeface="Times New Roman" panose="02020603050405020304" pitchFamily="18" charset="0"/>
-            </a:endParaRPr>
-          </a:p>
-        </p:txBody>
-      </p:sp>
       <p:sp>
         <p:nvSpPr>
           <p:cNvPr id="29" name="Rectangle 28"/>
@@ -5064,9 +4749,7 @@
       <p:cxnSp>
         <p:nvCxnSpPr>
           <p:cNvPr id="48" name="Straight Arrow Connector 47"/>
-          <p:cNvCxnSpPr>
-            <a:stCxn id="28" idx="2"/>
-          </p:cNvCxnSpPr>
+          <p:cNvCxnSpPr/>
           <p:nvPr/>
         </p:nvCxnSpPr>
         <p:spPr>
@@ -5077,12 +4760,9 @@
           <a:prstGeom prst="straightConnector1">
             <a:avLst/>
           </a:prstGeom>
-          <a:ln w="19050">
+          <a:ln w="12700">
             <a:solidFill>
-              <a:schemeClr val="tx1">
-                <a:lumMod val="95000"/>
-                <a:lumOff val="5000"/>
-              </a:schemeClr>
+              <a:schemeClr val="tx1"/>
             </a:solidFill>
             <a:tailEnd type="triangle"/>
           </a:ln>
@@ -5116,12 +4796,9 @@
           <a:prstGeom prst="straightConnector1">
             <a:avLst/>
           </a:prstGeom>
-          <a:ln w="19050">
+          <a:ln w="12700">
             <a:solidFill>
-              <a:schemeClr val="tx1">
-                <a:lumMod val="95000"/>
-                <a:lumOff val="5000"/>
-              </a:schemeClr>
+              <a:schemeClr val="tx1"/>
             </a:solidFill>
             <a:tailEnd type="triangle"/>
           </a:ln>
@@ -5155,12 +4832,9 @@
           <a:prstGeom prst="straightConnector1">
             <a:avLst/>
           </a:prstGeom>
-          <a:ln w="19050">
+          <a:ln w="12700">
             <a:solidFill>
-              <a:schemeClr val="tx1">
-                <a:lumMod val="95000"/>
-                <a:lumOff val="5000"/>
-              </a:schemeClr>
+              <a:schemeClr val="tx1"/>
             </a:solidFill>
             <a:tailEnd type="triangle"/>
           </a:ln>
@@ -5239,7 +4913,7 @@
                 <a:gridCol w="1098149">
                   <a:extLst>
                     <a:ext uri="{9D8B030D-6E8A-4147-A177-3AD203B41FA5}">
-                      <a16:colId xmlns="" xmlns:a16="http://schemas.microsoft.com/office/drawing/2014/main" val="20001"/>
+                      <a16:colId xmlns:a16="http://schemas.microsoft.com/office/drawing/2014/main" xmlns="" val="20001"/>
                     </a:ext>
                   </a:extLst>
                 </a:gridCol>
@@ -5270,7 +4944,7 @@
                 </a:tc>
                 <a:extLst>
                   <a:ext uri="{0D108BD9-81ED-4DB2-BD59-A6C34878D82A}">
-                    <a16:rowId xmlns="" xmlns:a16="http://schemas.microsoft.com/office/drawing/2014/main" val="10000"/>
+                    <a16:rowId xmlns:a16="http://schemas.microsoft.com/office/drawing/2014/main" xmlns="" val="10000"/>
                   </a:ext>
                 </a:extLst>
               </a:tr>
@@ -5307,7 +4981,7 @@
                 </a:tc>
                 <a:extLst>
                   <a:ext uri="{0D108BD9-81ED-4DB2-BD59-A6C34878D82A}">
-                    <a16:rowId xmlns="" xmlns:a16="http://schemas.microsoft.com/office/drawing/2014/main" val="10001"/>
+                    <a16:rowId xmlns:a16="http://schemas.microsoft.com/office/drawing/2014/main" xmlns="" val="10001"/>
                   </a:ext>
                 </a:extLst>
               </a:tr>
@@ -5344,7 +5018,7 @@
                 </a:tc>
                 <a:extLst>
                   <a:ext uri="{0D108BD9-81ED-4DB2-BD59-A6C34878D82A}">
-                    <a16:rowId xmlns="" xmlns:a16="http://schemas.microsoft.com/office/drawing/2014/main" val="10002"/>
+                    <a16:rowId xmlns:a16="http://schemas.microsoft.com/office/drawing/2014/main" xmlns="" val="10002"/>
                   </a:ext>
                 </a:extLst>
               </a:tr>
@@ -5398,7 +5072,7 @@
                 </a:tc>
                 <a:extLst>
                   <a:ext uri="{0D108BD9-81ED-4DB2-BD59-A6C34878D82A}">
-                    <a16:rowId xmlns="" xmlns:a16="http://schemas.microsoft.com/office/drawing/2014/main" val="10003"/>
+                    <a16:rowId xmlns:a16="http://schemas.microsoft.com/office/drawing/2014/main" xmlns="" val="10003"/>
                   </a:ext>
                 </a:extLst>
               </a:tr>
@@ -5502,7 +5176,7 @@
                 </a:tc>
                 <a:extLst>
                   <a:ext uri="{0D108BD9-81ED-4DB2-BD59-A6C34878D82A}">
-                    <a16:rowId xmlns="" xmlns:a16="http://schemas.microsoft.com/office/drawing/2014/main" val="10004"/>
+                    <a16:rowId xmlns:a16="http://schemas.microsoft.com/office/drawing/2014/main" xmlns="" val="10004"/>
                   </a:ext>
                 </a:extLst>
               </a:tr>
@@ -5538,7 +5212,7 @@
                 <a:gridCol w="1060293">
                   <a:extLst>
                     <a:ext uri="{9D8B030D-6E8A-4147-A177-3AD203B41FA5}">
-                      <a16:colId xmlns="" xmlns:a16="http://schemas.microsoft.com/office/drawing/2014/main" val="20001"/>
+                      <a16:colId xmlns:a16="http://schemas.microsoft.com/office/drawing/2014/main" xmlns="" val="20001"/>
                     </a:ext>
                   </a:extLst>
                 </a:gridCol>
@@ -5569,7 +5243,7 @@
                 </a:tc>
                 <a:extLst>
                   <a:ext uri="{0D108BD9-81ED-4DB2-BD59-A6C34878D82A}">
-                    <a16:rowId xmlns="" xmlns:a16="http://schemas.microsoft.com/office/drawing/2014/main" val="10000"/>
+                    <a16:rowId xmlns:a16="http://schemas.microsoft.com/office/drawing/2014/main" xmlns="" val="10000"/>
                   </a:ext>
                 </a:extLst>
               </a:tr>
@@ -5606,7 +5280,7 @@
                 </a:tc>
                 <a:extLst>
                   <a:ext uri="{0D108BD9-81ED-4DB2-BD59-A6C34878D82A}">
-                    <a16:rowId xmlns="" xmlns:a16="http://schemas.microsoft.com/office/drawing/2014/main" val="10001"/>
+                    <a16:rowId xmlns:a16="http://schemas.microsoft.com/office/drawing/2014/main" xmlns="" val="10001"/>
                   </a:ext>
                 </a:extLst>
               </a:tr>
@@ -5643,7 +5317,7 @@
                 </a:tc>
                 <a:extLst>
                   <a:ext uri="{0D108BD9-81ED-4DB2-BD59-A6C34878D82A}">
-                    <a16:rowId xmlns="" xmlns:a16="http://schemas.microsoft.com/office/drawing/2014/main" val="10002"/>
+                    <a16:rowId xmlns:a16="http://schemas.microsoft.com/office/drawing/2014/main" xmlns="" val="10002"/>
                   </a:ext>
                 </a:extLst>
               </a:tr>
@@ -5666,7 +5340,7 @@
                 </a:tc>
                 <a:extLst>
                   <a:ext uri="{0D108BD9-81ED-4DB2-BD59-A6C34878D82A}">
-                    <a16:rowId xmlns="" xmlns:a16="http://schemas.microsoft.com/office/drawing/2014/main" val="10003"/>
+                    <a16:rowId xmlns:a16="http://schemas.microsoft.com/office/drawing/2014/main" xmlns="" val="10003"/>
                   </a:ext>
                 </a:extLst>
               </a:tr>
@@ -5703,7 +5377,7 @@
                 </a:tc>
                 <a:extLst>
                   <a:ext uri="{0D108BD9-81ED-4DB2-BD59-A6C34878D82A}">
-                    <a16:rowId xmlns="" xmlns:a16="http://schemas.microsoft.com/office/drawing/2014/main" val="10004"/>
+                    <a16:rowId xmlns:a16="http://schemas.microsoft.com/office/drawing/2014/main" xmlns="" val="10004"/>
                   </a:ext>
                 </a:extLst>
               </a:tr>
@@ -5739,7 +5413,7 @@
                 <a:gridCol w="1158194">
                   <a:extLst>
                     <a:ext uri="{9D8B030D-6E8A-4147-A177-3AD203B41FA5}">
-                      <a16:colId xmlns="" xmlns:a16="http://schemas.microsoft.com/office/drawing/2014/main" val="20001"/>
+                      <a16:colId xmlns:a16="http://schemas.microsoft.com/office/drawing/2014/main" xmlns="" val="20001"/>
                     </a:ext>
                   </a:extLst>
                 </a:gridCol>
@@ -5770,7 +5444,7 @@
                 </a:tc>
                 <a:extLst>
                   <a:ext uri="{0D108BD9-81ED-4DB2-BD59-A6C34878D82A}">
-                    <a16:rowId xmlns="" xmlns:a16="http://schemas.microsoft.com/office/drawing/2014/main" val="10000"/>
+                    <a16:rowId xmlns:a16="http://schemas.microsoft.com/office/drawing/2014/main" xmlns="" val="10000"/>
                   </a:ext>
                 </a:extLst>
               </a:tr>
@@ -5807,7 +5481,7 @@
                 </a:tc>
                 <a:extLst>
                   <a:ext uri="{0D108BD9-81ED-4DB2-BD59-A6C34878D82A}">
-                    <a16:rowId xmlns="" xmlns:a16="http://schemas.microsoft.com/office/drawing/2014/main" val="10001"/>
+                    <a16:rowId xmlns:a16="http://schemas.microsoft.com/office/drawing/2014/main" xmlns="" val="10001"/>
                   </a:ext>
                 </a:extLst>
               </a:tr>
@@ -5844,7 +5518,7 @@
                 </a:tc>
                 <a:extLst>
                   <a:ext uri="{0D108BD9-81ED-4DB2-BD59-A6C34878D82A}">
-                    <a16:rowId xmlns="" xmlns:a16="http://schemas.microsoft.com/office/drawing/2014/main" val="10002"/>
+                    <a16:rowId xmlns:a16="http://schemas.microsoft.com/office/drawing/2014/main" xmlns="" val="10002"/>
                   </a:ext>
                 </a:extLst>
               </a:tr>
@@ -5898,7 +5572,7 @@
                 </a:tc>
                 <a:extLst>
                   <a:ext uri="{0D108BD9-81ED-4DB2-BD59-A6C34878D82A}">
-                    <a16:rowId xmlns="" xmlns:a16="http://schemas.microsoft.com/office/drawing/2014/main" val="10003"/>
+                    <a16:rowId xmlns:a16="http://schemas.microsoft.com/office/drawing/2014/main" xmlns="" val="10003"/>
                   </a:ext>
                 </a:extLst>
               </a:tr>
@@ -5953,7 +5627,7 @@
                 </a:tc>
                 <a:extLst>
                   <a:ext uri="{0D108BD9-81ED-4DB2-BD59-A6C34878D82A}">
-                    <a16:rowId xmlns="" xmlns:a16="http://schemas.microsoft.com/office/drawing/2014/main" val="10004"/>
+                    <a16:rowId xmlns:a16="http://schemas.microsoft.com/office/drawing/2014/main" xmlns="" val="10004"/>
                   </a:ext>
                 </a:extLst>
               </a:tr>
@@ -6115,21 +5789,21 @@
                 <a:gridCol w="1242400">
                   <a:extLst>
                     <a:ext uri="{9D8B030D-6E8A-4147-A177-3AD203B41FA5}">
-                      <a16:colId xmlns="" xmlns:a16="http://schemas.microsoft.com/office/drawing/2014/main" val="20000"/>
+                      <a16:colId xmlns:a16="http://schemas.microsoft.com/office/drawing/2014/main" xmlns="" val="20000"/>
                     </a:ext>
                   </a:extLst>
                 </a:gridCol>
                 <a:gridCol w="1148926">
                   <a:extLst>
                     <a:ext uri="{9D8B030D-6E8A-4147-A177-3AD203B41FA5}">
-                      <a16:colId xmlns="" xmlns:a16="http://schemas.microsoft.com/office/drawing/2014/main" val="20001"/>
+                      <a16:colId xmlns:a16="http://schemas.microsoft.com/office/drawing/2014/main" xmlns="" val="20001"/>
                     </a:ext>
                   </a:extLst>
                 </a:gridCol>
                 <a:gridCol w="1402505">
                   <a:extLst>
                     <a:ext uri="{9D8B030D-6E8A-4147-A177-3AD203B41FA5}">
-                      <a16:colId xmlns="" xmlns:a16="http://schemas.microsoft.com/office/drawing/2014/main" val="20002"/>
+                      <a16:colId xmlns:a16="http://schemas.microsoft.com/office/drawing/2014/main" xmlns="" val="20002"/>
                     </a:ext>
                   </a:extLst>
                 </a:gridCol>
@@ -6194,7 +5868,7 @@
                 </a:tc>
                 <a:extLst>
                   <a:ext uri="{0D108BD9-81ED-4DB2-BD59-A6C34878D82A}">
-                    <a16:rowId xmlns="" xmlns:a16="http://schemas.microsoft.com/office/drawing/2014/main" val="10000"/>
+                    <a16:rowId xmlns:a16="http://schemas.microsoft.com/office/drawing/2014/main" xmlns="" val="10000"/>
                   </a:ext>
                 </a:extLst>
               </a:tr>
@@ -6302,6 +5976,258 @@
           </a:graphicData>
         </a:graphic>
       </p:graphicFrame>
+      <p:cxnSp>
+        <p:nvCxnSpPr>
+          <p:cNvPr id="4" name="Straight Arrow Connector 3"/>
+          <p:cNvCxnSpPr/>
+          <p:nvPr/>
+        </p:nvCxnSpPr>
+        <p:spPr>
+          <a:xfrm>
+            <a:off x="2927031" y="861358"/>
+            <a:ext cx="0" cy="500778"/>
+          </a:xfrm>
+          <a:prstGeom prst="straightConnector1">
+            <a:avLst/>
+          </a:prstGeom>
+          <a:ln w="38100">
+            <a:solidFill>
+              <a:schemeClr val="tx1"/>
+            </a:solidFill>
+            <a:tailEnd type="triangle"/>
+          </a:ln>
+        </p:spPr>
+        <p:style>
+          <a:lnRef idx="1">
+            <a:schemeClr val="accent1"/>
+          </a:lnRef>
+          <a:fillRef idx="0">
+            <a:schemeClr val="accent1"/>
+          </a:fillRef>
+          <a:effectRef idx="0">
+            <a:schemeClr val="accent1"/>
+          </a:effectRef>
+          <a:fontRef idx="minor">
+            <a:schemeClr val="tx1"/>
+          </a:fontRef>
+        </p:style>
+      </p:cxnSp>
+      <p:cxnSp>
+        <p:nvCxnSpPr>
+          <p:cNvPr id="9" name="Straight Arrow Connector 8"/>
+          <p:cNvCxnSpPr/>
+          <p:nvPr/>
+        </p:nvCxnSpPr>
+        <p:spPr>
+          <a:xfrm>
+            <a:off x="5120802" y="5354111"/>
+            <a:ext cx="1081910" cy="0"/>
+          </a:xfrm>
+          <a:prstGeom prst="straightConnector1">
+            <a:avLst/>
+          </a:prstGeom>
+          <a:ln w="38100">
+            <a:solidFill>
+              <a:schemeClr val="tx1"/>
+            </a:solidFill>
+            <a:tailEnd type="triangle"/>
+          </a:ln>
+        </p:spPr>
+        <p:style>
+          <a:lnRef idx="1">
+            <a:schemeClr val="accent1"/>
+          </a:lnRef>
+          <a:fillRef idx="0">
+            <a:schemeClr val="accent1"/>
+          </a:fillRef>
+          <a:effectRef idx="0">
+            <a:schemeClr val="accent1"/>
+          </a:effectRef>
+          <a:fontRef idx="minor">
+            <a:schemeClr val="tx1"/>
+          </a:fontRef>
+        </p:style>
+      </p:cxnSp>
+      <p:cxnSp>
+        <p:nvCxnSpPr>
+          <p:cNvPr id="11" name="Straight Arrow Connector 10"/>
+          <p:cNvCxnSpPr/>
+          <p:nvPr/>
+        </p:nvCxnSpPr>
+        <p:spPr>
+          <a:xfrm>
+            <a:off x="2982786" y="8355891"/>
+            <a:ext cx="0" cy="851806"/>
+          </a:xfrm>
+          <a:prstGeom prst="straightConnector1">
+            <a:avLst/>
+          </a:prstGeom>
+          <a:ln w="38100">
+            <a:solidFill>
+              <a:schemeClr val="tx1"/>
+            </a:solidFill>
+            <a:tailEnd type="triangle"/>
+          </a:ln>
+        </p:spPr>
+        <p:style>
+          <a:lnRef idx="1">
+            <a:schemeClr val="accent1"/>
+          </a:lnRef>
+          <a:fillRef idx="0">
+            <a:schemeClr val="accent1"/>
+          </a:fillRef>
+          <a:effectRef idx="0">
+            <a:schemeClr val="accent1"/>
+          </a:effectRef>
+          <a:fontRef idx="minor">
+            <a:schemeClr val="tx1"/>
+          </a:fontRef>
+        </p:style>
+      </p:cxnSp>
+      <p:cxnSp>
+        <p:nvCxnSpPr>
+          <p:cNvPr id="13" name="Straight Arrow Connector 12"/>
+          <p:cNvCxnSpPr/>
+          <p:nvPr/>
+        </p:nvCxnSpPr>
+        <p:spPr>
+          <a:xfrm flipV="1">
+            <a:off x="8105901" y="11170905"/>
+            <a:ext cx="4374" cy="664812"/>
+          </a:xfrm>
+          <a:prstGeom prst="straightConnector1">
+            <a:avLst/>
+          </a:prstGeom>
+          <a:ln w="38100">
+            <a:solidFill>
+              <a:schemeClr val="tx1"/>
+            </a:solidFill>
+            <a:tailEnd type="triangle"/>
+          </a:ln>
+        </p:spPr>
+        <p:style>
+          <a:lnRef idx="1">
+            <a:schemeClr val="accent1"/>
+          </a:lnRef>
+          <a:fillRef idx="0">
+            <a:schemeClr val="accent1"/>
+          </a:fillRef>
+          <a:effectRef idx="0">
+            <a:schemeClr val="accent1"/>
+          </a:effectRef>
+          <a:fontRef idx="minor">
+            <a:schemeClr val="tx1"/>
+          </a:fontRef>
+        </p:style>
+      </p:cxnSp>
+      <p:cxnSp>
+        <p:nvCxnSpPr>
+          <p:cNvPr id="15" name="Straight Arrow Connector 14"/>
+          <p:cNvCxnSpPr/>
+          <p:nvPr/>
+        </p:nvCxnSpPr>
+        <p:spPr>
+          <a:xfrm flipH="1" flipV="1">
+            <a:off x="8089900" y="8840102"/>
+            <a:ext cx="7679" cy="1519840"/>
+          </a:xfrm>
+          <a:prstGeom prst="straightConnector1">
+            <a:avLst/>
+          </a:prstGeom>
+          <a:ln w="38100">
+            <a:solidFill>
+              <a:schemeClr val="tx1"/>
+            </a:solidFill>
+            <a:tailEnd type="triangle"/>
+          </a:ln>
+        </p:spPr>
+        <p:style>
+          <a:lnRef idx="1">
+            <a:schemeClr val="accent1"/>
+          </a:lnRef>
+          <a:fillRef idx="0">
+            <a:schemeClr val="accent1"/>
+          </a:fillRef>
+          <a:effectRef idx="0">
+            <a:schemeClr val="accent1"/>
+          </a:effectRef>
+          <a:fontRef idx="minor">
+            <a:schemeClr val="tx1"/>
+          </a:fontRef>
+        </p:style>
+      </p:cxnSp>
+      <p:cxnSp>
+        <p:nvCxnSpPr>
+          <p:cNvPr id="52" name="Straight Arrow Connector 51"/>
+          <p:cNvCxnSpPr/>
+          <p:nvPr/>
+        </p:nvCxnSpPr>
+        <p:spPr>
+          <a:xfrm flipH="1">
+            <a:off x="4581526" y="8005763"/>
+            <a:ext cx="1428750" cy="0"/>
+          </a:xfrm>
+          <a:prstGeom prst="straightConnector1">
+            <a:avLst/>
+          </a:prstGeom>
+          <a:ln w="38100">
+            <a:solidFill>
+              <a:schemeClr val="tx1"/>
+            </a:solidFill>
+            <a:tailEnd type="triangle"/>
+          </a:ln>
+        </p:spPr>
+        <p:style>
+          <a:lnRef idx="1">
+            <a:schemeClr val="accent1"/>
+          </a:lnRef>
+          <a:fillRef idx="0">
+            <a:schemeClr val="accent1"/>
+          </a:fillRef>
+          <a:effectRef idx="0">
+            <a:schemeClr val="accent1"/>
+          </a:effectRef>
+          <a:fontRef idx="minor">
+            <a:schemeClr val="tx1"/>
+          </a:fontRef>
+        </p:style>
+      </p:cxnSp>
+      <p:cxnSp>
+        <p:nvCxnSpPr>
+          <p:cNvPr id="71" name="Straight Arrow Connector 70"/>
+          <p:cNvCxnSpPr/>
+          <p:nvPr/>
+        </p:nvCxnSpPr>
+        <p:spPr>
+          <a:xfrm flipV="1">
+            <a:off x="5120802" y="2400300"/>
+            <a:ext cx="990438" cy="6813"/>
+          </a:xfrm>
+          <a:prstGeom prst="straightConnector1">
+            <a:avLst/>
+          </a:prstGeom>
+          <a:ln w="38100">
+            <a:solidFill>
+              <a:schemeClr val="tx1"/>
+            </a:solidFill>
+            <a:tailEnd type="triangle"/>
+          </a:ln>
+        </p:spPr>
+        <p:style>
+          <a:lnRef idx="1">
+            <a:schemeClr val="accent1"/>
+          </a:lnRef>
+          <a:fillRef idx="0">
+            <a:schemeClr val="accent1"/>
+          </a:fillRef>
+          <a:effectRef idx="0">
+            <a:schemeClr val="accent1"/>
+          </a:effectRef>
+          <a:fontRef idx="minor">
+            <a:schemeClr val="tx1"/>
+          </a:fontRef>
+        </p:style>
+      </p:cxnSp>
     </p:spTree>
     <p:extLst>
       <p:ext uri="{BB962C8B-B14F-4D97-AF65-F5344CB8AC3E}">

</xml_diff>